<commit_message>
file cleanup, expectation script.
</commit_message>
<xml_diff>
--- a/Summary/20201125_RDM_HW_rotation_update.pptx
+++ b/Summary/20201125_RDM_HW_rotation_update.pptx
@@ -246,7 +246,7 @@
           <a:p>
             <a:fld id="{2F446724-7A58-4020-9182-8374F0305DD3}" type="datetimeFigureOut">
               <a:rPr lang="en-US" smtClean="0"/>
-              <a:t>11/25/2020</a:t>
+              <a:t>12/2/2020</a:t>
             </a:fld>
             <a:endParaRPr lang="en-US"/>
           </a:p>
@@ -1365,7 +1365,7 @@
           <a:p>
             <a:fld id="{6A6E4237-9E27-40CF-A4D8-1330F92F21DA}" type="datetimeFigureOut">
               <a:rPr lang="en-US" smtClean="0"/>
-              <a:t>11/25/2020</a:t>
+              <a:t>12/2/2020</a:t>
             </a:fld>
             <a:endParaRPr lang="en-US"/>
           </a:p>
@@ -1563,7 +1563,7 @@
           <a:p>
             <a:fld id="{6A6E4237-9E27-40CF-A4D8-1330F92F21DA}" type="datetimeFigureOut">
               <a:rPr lang="en-US" smtClean="0"/>
-              <a:t>11/25/2020</a:t>
+              <a:t>12/2/2020</a:t>
             </a:fld>
             <a:endParaRPr lang="en-US"/>
           </a:p>
@@ -1771,7 +1771,7 @@
           <a:p>
             <a:fld id="{6A6E4237-9E27-40CF-A4D8-1330F92F21DA}" type="datetimeFigureOut">
               <a:rPr lang="en-US" smtClean="0"/>
-              <a:t>11/25/2020</a:t>
+              <a:t>12/2/2020</a:t>
             </a:fld>
             <a:endParaRPr lang="en-US"/>
           </a:p>
@@ -1969,7 +1969,7 @@
           <a:p>
             <a:fld id="{6A6E4237-9E27-40CF-A4D8-1330F92F21DA}" type="datetimeFigureOut">
               <a:rPr lang="en-US" smtClean="0"/>
-              <a:t>11/25/2020</a:t>
+              <a:t>12/2/2020</a:t>
             </a:fld>
             <a:endParaRPr lang="en-US"/>
           </a:p>
@@ -2244,7 +2244,7 @@
           <a:p>
             <a:fld id="{6A6E4237-9E27-40CF-A4D8-1330F92F21DA}" type="datetimeFigureOut">
               <a:rPr lang="en-US" smtClean="0"/>
-              <a:t>11/25/2020</a:t>
+              <a:t>12/2/2020</a:t>
             </a:fld>
             <a:endParaRPr lang="en-US"/>
           </a:p>
@@ -2509,7 +2509,7 @@
           <a:p>
             <a:fld id="{6A6E4237-9E27-40CF-A4D8-1330F92F21DA}" type="datetimeFigureOut">
               <a:rPr lang="en-US" smtClean="0"/>
-              <a:t>11/25/2020</a:t>
+              <a:t>12/2/2020</a:t>
             </a:fld>
             <a:endParaRPr lang="en-US"/>
           </a:p>
@@ -2921,7 +2921,7 @@
           <a:p>
             <a:fld id="{6A6E4237-9E27-40CF-A4D8-1330F92F21DA}" type="datetimeFigureOut">
               <a:rPr lang="en-US" smtClean="0"/>
-              <a:t>11/25/2020</a:t>
+              <a:t>12/2/2020</a:t>
             </a:fld>
             <a:endParaRPr lang="en-US"/>
           </a:p>
@@ -3062,7 +3062,7 @@
           <a:p>
             <a:fld id="{6A6E4237-9E27-40CF-A4D8-1330F92F21DA}" type="datetimeFigureOut">
               <a:rPr lang="en-US" smtClean="0"/>
-              <a:t>11/25/2020</a:t>
+              <a:t>12/2/2020</a:t>
             </a:fld>
             <a:endParaRPr lang="en-US"/>
           </a:p>
@@ -3175,7 +3175,7 @@
           <a:p>
             <a:fld id="{6A6E4237-9E27-40CF-A4D8-1330F92F21DA}" type="datetimeFigureOut">
               <a:rPr lang="en-US" smtClean="0"/>
-              <a:t>11/25/2020</a:t>
+              <a:t>12/2/2020</a:t>
             </a:fld>
             <a:endParaRPr lang="en-US"/>
           </a:p>
@@ -3486,7 +3486,7 @@
           <a:p>
             <a:fld id="{6A6E4237-9E27-40CF-A4D8-1330F92F21DA}" type="datetimeFigureOut">
               <a:rPr lang="en-US" smtClean="0"/>
-              <a:t>11/25/2020</a:t>
+              <a:t>12/2/2020</a:t>
             </a:fld>
             <a:endParaRPr lang="en-US"/>
           </a:p>
@@ -3774,7 +3774,7 @@
           <a:p>
             <a:fld id="{6A6E4237-9E27-40CF-A4D8-1330F92F21DA}" type="datetimeFigureOut">
               <a:rPr lang="en-US" smtClean="0"/>
-              <a:t>11/25/2020</a:t>
+              <a:t>12/2/2020</a:t>
             </a:fld>
             <a:endParaRPr lang="en-US"/>
           </a:p>
@@ -4015,7 +4015,7 @@
           <a:p>
             <a:fld id="{6A6E4237-9E27-40CF-A4D8-1330F92F21DA}" type="datetimeFigureOut">
               <a:rPr lang="en-US" smtClean="0"/>
-              <a:t>11/25/2020</a:t>
+              <a:t>12/2/2020</a:t>
             </a:fld>
             <a:endParaRPr lang="en-US"/>
           </a:p>
@@ -12669,13 +12669,10 @@
           <a:bodyPr/>
           <a:lstStyle/>
           <a:p>
-            <a:r>
-              <a:rPr lang="en-US" dirty="0">
-                <a:latin typeface="Yu Gothic" panose="020B0400000000000000" pitchFamily="34" charset="-128"/>
-                <a:ea typeface="Yu Gothic" panose="020B0400000000000000" pitchFamily="34" charset="-128"/>
-              </a:rPr>
-              <a:t>Have a nice Thanksgiving!</a:t>
-            </a:r>
+            <a:endParaRPr lang="en-US" dirty="0">
+              <a:latin typeface="Yu Gothic" panose="020B0400000000000000" pitchFamily="34" charset="-128"/>
+              <a:ea typeface="Yu Gothic" panose="020B0400000000000000" pitchFamily="34" charset="-128"/>
+            </a:endParaRPr>
           </a:p>
         </p:txBody>
       </p:sp>
@@ -15499,20 +15496,20 @@
           <a:p>
             <a:r>
               <a:rPr lang="en-US" dirty="0">
+                <a:highlight>
+                  <a:srgbClr val="FFFF00"/>
+                </a:highlight>
                 <a:latin typeface="Yu Gothic" panose="020B0400000000000000" pitchFamily="34" charset="-128"/>
                 <a:ea typeface="Yu Gothic" panose="020B0400000000000000" pitchFamily="34" charset="-128"/>
               </a:rPr>
-              <a:t>1,000 individuals (hermaphroditic, diploid)</a:t>
-            </a:r>
-          </a:p>
-          <a:p>
-            <a:pPr lvl="1"/>
+              <a:t>10,000</a:t>
+            </a:r>
             <a:r>
               <a:rPr lang="en-US" dirty="0">
                 <a:latin typeface="Yu Gothic" panose="020B0400000000000000" pitchFamily="34" charset="-128"/>
                 <a:ea typeface="Yu Gothic" panose="020B0400000000000000" pitchFamily="34" charset="-128"/>
               </a:rPr>
-              <a:t>12,000 generation burn in</a:t>
+              <a:t> individuals (hermaphroditic, diploid)</a:t>
             </a:r>
           </a:p>
           <a:p>
@@ -15522,7 +15519,17 @@
                 <a:latin typeface="Yu Gothic" panose="020B0400000000000000" pitchFamily="34" charset="-128"/>
                 <a:ea typeface="Yu Gothic" panose="020B0400000000000000" pitchFamily="34" charset="-128"/>
               </a:rPr>
-              <a:t>Random initial seed = {1, 2, 3} (rest can be derived)</a:t>
+              <a:t>100,000 generation burn in</a:t>
+            </a:r>
+          </a:p>
+          <a:p>
+            <a:pPr lvl="1"/>
+            <a:r>
+              <a:rPr lang="en-US" dirty="0">
+                <a:latin typeface="Yu Gothic" panose="020B0400000000000000" pitchFamily="34" charset="-128"/>
+                <a:ea typeface="Yu Gothic" panose="020B0400000000000000" pitchFamily="34" charset="-128"/>
+              </a:rPr>
+              <a:t>Random initial seed = {1} (rest can be derived)</a:t>
             </a:r>
           </a:p>
           <a:p>
@@ -15690,7 +15697,7 @@
                 <a:latin typeface="Yu Gothic" panose="020B0400000000000000" pitchFamily="34" charset="-128"/>
                 <a:ea typeface="Yu Gothic" panose="020B0400000000000000" pitchFamily="34" charset="-128"/>
               </a:rPr>
-              <a:t>Compute one-sided Fishers-test (&lt;= x homozygotes)</a:t>
+              <a:t>Increased size of simulations by 10x</a:t>
             </a:r>
           </a:p>
           <a:p>
@@ -15699,55 +15706,70 @@
                 <a:latin typeface="Yu Gothic" panose="020B0400000000000000" pitchFamily="34" charset="-128"/>
                 <a:ea typeface="Yu Gothic" panose="020B0400000000000000" pitchFamily="34" charset="-128"/>
               </a:rPr>
-              <a:t>Compute one-sided Fishers-test (&gt;= x homozygotes)</a:t>
-            </a:r>
-          </a:p>
-          <a:p>
-            <a:pPr lvl="1"/>
+              <a:t>Compute expectation for cases when </a:t>
+            </a:r>
+            <a:r>
+              <a:rPr lang="en-US" dirty="0" err="1">
+                <a:latin typeface="Yu Gothic" panose="020B0400000000000000" pitchFamily="34" charset="-128"/>
+                <a:ea typeface="Yu Gothic" panose="020B0400000000000000" pitchFamily="34" charset="-128"/>
+              </a:rPr>
+              <a:t>n_ton</a:t>
+            </a:r>
             <a:r>
               <a:rPr lang="en-US" dirty="0">
                 <a:latin typeface="Yu Gothic" panose="020B0400000000000000" pitchFamily="34" charset="-128"/>
                 <a:ea typeface="Yu Gothic" panose="020B0400000000000000" pitchFamily="34" charset="-128"/>
               </a:rPr>
-              <a:t>This might help indicate departures from Hardy-Weinberg</a:t>
-            </a:r>
-          </a:p>
-          <a:p>
+              <a:t> &gt; </a:t>
+            </a:r>
+            <a:r>
+              <a:rPr lang="en-US" dirty="0" err="1">
+                <a:latin typeface="Yu Gothic" panose="020B0400000000000000" pitchFamily="34" charset="-128"/>
+                <a:ea typeface="Yu Gothic" panose="020B0400000000000000" pitchFamily="34" charset="-128"/>
+              </a:rPr>
+              <a:t>num_ind</a:t>
+            </a:r>
+            <a:endParaRPr lang="en-US" dirty="0">
+              <a:latin typeface="Yu Gothic" panose="020B0400000000000000" pitchFamily="34" charset="-128"/>
+              <a:ea typeface="Yu Gothic" panose="020B0400000000000000" pitchFamily="34" charset="-128"/>
+            </a:endParaRPr>
+          </a:p>
+          <a:p>
+            <a:pPr lvl="1"/>
             <a:r>
               <a:rPr lang="en-US" dirty="0">
                 <a:latin typeface="Yu Gothic" panose="020B0400000000000000" pitchFamily="34" charset="-128"/>
                 <a:ea typeface="Yu Gothic" panose="020B0400000000000000" pitchFamily="34" charset="-128"/>
               </a:rPr>
-              <a:t>Computed two-sided test</a:t>
+              <a:t>(reverse the minor allele!)</a:t>
+            </a:r>
+          </a:p>
+          <a:p>
+            <a:r>
+              <a:rPr lang="en-US" dirty="0"/>
+              <a:t>Compute average number of homozygotes in data</a:t>
             </a:r>
           </a:p>
           <a:p>
             <a:pPr lvl="1"/>
             <a:r>
-              <a:rPr lang="en-US" dirty="0">
-                <a:latin typeface="Yu Gothic" panose="020B0400000000000000" pitchFamily="34" charset="-128"/>
-                <a:ea typeface="Yu Gothic" panose="020B0400000000000000" pitchFamily="34" charset="-128"/>
-              </a:rPr>
-              <a:t>Find pr(X=x)</a:t>
+              <a:rPr lang="en-US" dirty="0"/>
+              <a:t>Compare to expected number of homozygotes</a:t>
             </a:r>
           </a:p>
           <a:p>
             <a:pPr lvl="1"/>
             <a:r>
-              <a:rPr lang="en-US" dirty="0">
-                <a:latin typeface="Yu Gothic" panose="020B0400000000000000" pitchFamily="34" charset="-128"/>
-                <a:ea typeface="Yu Gothic" panose="020B0400000000000000" pitchFamily="34" charset="-128"/>
-              </a:rPr>
-              <a:t>Sum all probabilities &lt;= x, i.e., the more extreme cases.</a:t>
-            </a:r>
-          </a:p>
-          <a:p>
-            <a:r>
-              <a:rPr lang="en-US" dirty="0">
-                <a:latin typeface="Yu Gothic" panose="020B0400000000000000" pitchFamily="34" charset="-128"/>
-                <a:ea typeface="Yu Gothic" panose="020B0400000000000000" pitchFamily="34" charset="-128"/>
-              </a:rPr>
-              <a:t>Check edge cases by hand</a:t>
+              <a:rPr lang="en-US" dirty="0"/>
+              <a:t>Partition by </a:t>
+            </a:r>
+            <a:r>
+              <a:rPr lang="en-US" dirty="0" err="1"/>
+              <a:t>n_ton</a:t>
+            </a:r>
+            <a:r>
+              <a:rPr lang="en-US" dirty="0"/>
+              <a:t> count</a:t>
             </a:r>
           </a:p>
           <a:p>

</xml_diff>